<commit_message>
1. Add Ideas to be further implemented in THE_IDEA.docx file 2. Modify name error in CRIO.pptx file
</commit_message>
<xml_diff>
--- a/CRIO.pptx
+++ b/CRIO.pptx
@@ -112,7 +112,7 @@
   </p:defaultTextStyle>
   <p:extLst>
     <p:ext uri="{EFAFB233-063F-42B5-8137-9DF3F51BA10A}">
-      <p15:sldGuideLst xmlns:p15="http://schemas.microsoft.com/office/powerpoint/2012/main"/>
+      <p15:sldGuideLst xmlns:p15="http://schemas.microsoft.com/office/powerpoint/2012/main" xmlns=""/>
     </p:ext>
   </p:extLst>
 </p:presentation>
@@ -332,7 +332,7 @@
             <a:fld id="{B61BEF0D-F0BB-DE4B-95CE-6DB70DBA9567}" type="datetimeFigureOut">
               <a:rPr lang="en-US" dirty="0"/>
               <a:pPr/>
-              <a:t>7/14/2019</a:t>
+              <a:t>7/15/2019</a:t>
             </a:fld>
             <a:endParaRPr lang="en-US" dirty="0"/>
           </a:p>
@@ -620,7 +620,7 @@
             <a:fld id="{B61BEF0D-F0BB-DE4B-95CE-6DB70DBA9567}" type="datetimeFigureOut">
               <a:rPr lang="en-US" dirty="0"/>
               <a:pPr/>
-              <a:t>7/14/2019</a:t>
+              <a:t>7/15/2019</a:t>
             </a:fld>
             <a:endParaRPr lang="en-US" dirty="0"/>
           </a:p>
@@ -876,7 +876,7 @@
             <a:fld id="{B61BEF0D-F0BB-DE4B-95CE-6DB70DBA9567}" type="datetimeFigureOut">
               <a:rPr lang="en-US" dirty="0"/>
               <a:pPr/>
-              <a:t>7/14/2019</a:t>
+              <a:t>7/15/2019</a:t>
             </a:fld>
             <a:endParaRPr lang="en-US" dirty="0"/>
           </a:p>
@@ -1342,7 +1342,7 @@
             <a:fld id="{B61BEF0D-F0BB-DE4B-95CE-6DB70DBA9567}" type="datetimeFigureOut">
               <a:rPr lang="en-US" dirty="0"/>
               <a:pPr/>
-              <a:t>7/14/2019</a:t>
+              <a:t>7/15/2019</a:t>
             </a:fld>
             <a:endParaRPr lang="en-US" dirty="0"/>
           </a:p>
@@ -1519,7 +1519,7 @@
             <a:fld id="{B61BEF0D-F0BB-DE4B-95CE-6DB70DBA9567}" type="datetimeFigureOut">
               <a:rPr lang="en-US" dirty="0"/>
               <a:pPr/>
-              <a:t>7/14/2019</a:t>
+              <a:t>7/15/2019</a:t>
             </a:fld>
             <a:endParaRPr lang="en-US" dirty="0"/>
           </a:p>
@@ -2092,7 +2092,7 @@
             <a:fld id="{B61BEF0D-F0BB-DE4B-95CE-6DB70DBA9567}" type="datetimeFigureOut">
               <a:rPr lang="en-US" dirty="0"/>
               <a:pPr/>
-              <a:t>7/14/2019</a:t>
+              <a:t>7/15/2019</a:t>
             </a:fld>
             <a:endParaRPr lang="en-US" dirty="0"/>
           </a:p>
@@ -2421,7 +2421,7 @@
             <a:fld id="{B61BEF0D-F0BB-DE4B-95CE-6DB70DBA9567}" type="datetimeFigureOut">
               <a:rPr lang="en-US" dirty="0"/>
               <a:pPr/>
-              <a:t>7/14/2019</a:t>
+              <a:t>7/15/2019</a:t>
             </a:fld>
             <a:endParaRPr lang="en-US" dirty="0"/>
           </a:p>
@@ -2593,7 +2593,7 @@
             <a:fld id="{B61BEF0D-F0BB-DE4B-95CE-6DB70DBA9567}" type="datetimeFigureOut">
               <a:rPr lang="en-US" dirty="0"/>
               <a:pPr/>
-              <a:t>7/14/2019</a:t>
+              <a:t>7/15/2019</a:t>
             </a:fld>
             <a:endParaRPr lang="en-US" dirty="0"/>
           </a:p>
@@ -2770,7 +2770,7 @@
             <a:fld id="{B61BEF0D-F0BB-DE4B-95CE-6DB70DBA9567}" type="datetimeFigureOut">
               <a:rPr lang="en-US" dirty="0"/>
               <a:pPr/>
-              <a:t>7/14/2019</a:t>
+              <a:t>7/15/2019</a:t>
             </a:fld>
             <a:endParaRPr lang="en-US" dirty="0"/>
           </a:p>
@@ -2937,7 +2937,7 @@
             <a:fld id="{B61BEF0D-F0BB-DE4B-95CE-6DB70DBA9567}" type="datetimeFigureOut">
               <a:rPr lang="en-US" dirty="0"/>
               <a:pPr/>
-              <a:t>7/14/2019</a:t>
+              <a:t>7/15/2019</a:t>
             </a:fld>
             <a:endParaRPr lang="en-US" dirty="0"/>
           </a:p>
@@ -3191,7 +3191,7 @@
             <a:fld id="{B61BEF0D-F0BB-DE4B-95CE-6DB70DBA9567}" type="datetimeFigureOut">
               <a:rPr lang="en-US" dirty="0"/>
               <a:pPr/>
-              <a:t>7/14/2019</a:t>
+              <a:t>7/15/2019</a:t>
             </a:fld>
             <a:endParaRPr lang="en-US" dirty="0"/>
           </a:p>
@@ -3480,7 +3480,7 @@
             <a:fld id="{B61BEF0D-F0BB-DE4B-95CE-6DB70DBA9567}" type="datetimeFigureOut">
               <a:rPr lang="en-US" dirty="0"/>
               <a:pPr/>
-              <a:t>7/14/2019</a:t>
+              <a:t>7/15/2019</a:t>
             </a:fld>
             <a:endParaRPr lang="en-US" dirty="0"/>
           </a:p>
@@ -3907,7 +3907,7 @@
             <a:fld id="{B61BEF0D-F0BB-DE4B-95CE-6DB70DBA9567}" type="datetimeFigureOut">
               <a:rPr lang="en-US" dirty="0"/>
               <a:pPr/>
-              <a:t>7/14/2019</a:t>
+              <a:t>7/15/2019</a:t>
             </a:fld>
             <a:endParaRPr lang="en-US" dirty="0"/>
           </a:p>
@@ -4022,7 +4022,7 @@
             <a:fld id="{B61BEF0D-F0BB-DE4B-95CE-6DB70DBA9567}" type="datetimeFigureOut">
               <a:rPr lang="en-US" dirty="0"/>
               <a:pPr/>
-              <a:t>7/14/2019</a:t>
+              <a:t>7/15/2019</a:t>
             </a:fld>
             <a:endParaRPr lang="en-US" dirty="0"/>
           </a:p>
@@ -4114,7 +4114,7 @@
             <a:fld id="{B61BEF0D-F0BB-DE4B-95CE-6DB70DBA9567}" type="datetimeFigureOut">
               <a:rPr lang="en-US" dirty="0"/>
               <a:pPr/>
-              <a:t>7/14/2019</a:t>
+              <a:t>7/15/2019</a:t>
             </a:fld>
             <a:endParaRPr lang="en-US" dirty="0"/>
           </a:p>
@@ -4394,7 +4394,7 @@
             <a:fld id="{B61BEF0D-F0BB-DE4B-95CE-6DB70DBA9567}" type="datetimeFigureOut">
               <a:rPr lang="en-US" dirty="0"/>
               <a:pPr/>
-              <a:t>7/14/2019</a:t>
+              <a:t>7/15/2019</a:t>
             </a:fld>
             <a:endParaRPr lang="en-US" dirty="0"/>
           </a:p>
@@ -4682,7 +4682,7 @@
             <a:fld id="{B61BEF0D-F0BB-DE4B-95CE-6DB70DBA9567}" type="datetimeFigureOut">
               <a:rPr lang="en-US" dirty="0"/>
               <a:pPr/>
-              <a:t>7/14/2019</a:t>
+              <a:t>7/15/2019</a:t>
             </a:fld>
             <a:endParaRPr lang="en-US" dirty="0"/>
           </a:p>
@@ -4910,7 +4910,7 @@
             <a:fld id="{B61BEF0D-F0BB-DE4B-95CE-6DB70DBA9567}" type="datetimeFigureOut">
               <a:rPr lang="en-US" dirty="0"/>
               <a:pPr/>
-              <a:t>7/14/2019</a:t>
+              <a:t>7/15/2019</a:t>
             </a:fld>
             <a:endParaRPr lang="en-US" dirty="0"/>
           </a:p>
@@ -5987,13 +5987,8 @@
           <a:p>
             <a:r>
               <a:rPr lang="en-IN" dirty="0" smtClean="0"/>
-              <a:t>TEAM </a:t>
-            </a:r>
-            <a:r>
-              <a:rPr lang="en-IN" dirty="0" smtClean="0"/>
-              <a:t>LEADER,WATSON KNOWLEDGE STUDIO AND</a:t>
-            </a:r>
-            <a:endParaRPr lang="en-IN" dirty="0" smtClean="0"/>
+              <a:t>TEAM LEADER,WATSON KNOWLEDGE STUDIO AND</a:t>
+            </a:r>
           </a:p>
           <a:p>
             <a:r>
@@ -6285,8 +6280,12 @@
           <a:lstStyle/>
           <a:p>
             <a:r>
+              <a:rPr lang="en-IN" smtClean="0"/>
+              <a:t>SHIWANSHU </a:t>
+            </a:r>
+            <a:r>
               <a:rPr lang="en-IN" dirty="0" smtClean="0"/>
-              <a:t>SHIVANSHU MANI</a:t>
+              <a:t>MANI</a:t>
             </a:r>
             <a:endParaRPr lang="en-IN" dirty="0"/>
           </a:p>
@@ -6316,11 +6315,7 @@
           <a:p>
             <a:r>
               <a:rPr lang="en-IN" dirty="0" smtClean="0"/>
-              <a:t>Watson Assistant Integration </a:t>
-            </a:r>
-            <a:r>
-              <a:rPr lang="en-IN" dirty="0" smtClean="0"/>
-              <a:t>DEVELOPER</a:t>
+              <a:t>Watson Assistant Integration DEVELOPER</a:t>
             </a:r>
             <a:endParaRPr lang="en-IN" dirty="0"/>
           </a:p>
@@ -7645,7 +7640,7 @@
     </a:clrScheme>
     <a:fontScheme name="Mesh">
       <a:majorFont>
-        <a:latin typeface="Century Gothic" panose="020B0502020202020204"/>
+        <a:latin typeface="Century Gothic"/>
         <a:ea typeface=""/>
         <a:cs typeface=""/>
         <a:font script="Jpan" typeface="ＭＳ ゴシック"/>
@@ -7680,7 +7675,7 @@
         <a:font script="Geor" typeface="Sylfaen"/>
       </a:majorFont>
       <a:minorFont>
-        <a:latin typeface="Century Gothic" panose="020B0502020202020204"/>
+        <a:latin typeface="Century Gothic"/>
         <a:ea typeface=""/>
         <a:cs typeface=""/>
         <a:font script="Jpan" typeface="ＭＳ ゴシック"/>
@@ -7852,7 +7847,7 @@
   <a:extraClrSchemeLst/>
   <a:extLst>
     <a:ext uri="{05A4C25C-085E-4340-85A3-A5531E510DB2}">
-      <thm15:themeFamily xmlns:thm15="http://schemas.microsoft.com/office/thememl/2012/main" name="Mesh" id="{789EC3FE-34FD-429C-9918-760025E6C145}" vid="{B8BE45C0-8141-4D58-8C71-A009BC26FBBB}"/>
+      <thm15:themeFamily xmlns:thm15="http://schemas.microsoft.com/office/thememl/2012/main" xmlns="" name="Mesh" id="{789EC3FE-34FD-429C-9918-760025E6C145}" vid="{B8BE45C0-8141-4D58-8C71-A009BC26FBBB}"/>
     </a:ext>
   </a:extLst>
 </a:theme>

</xml_diff>